<commit_message>
committed more structured files
</commit_message>
<xml_diff>
--- a/Design Flow/GetStorageDetails Design Flow.pptx
+++ b/Design Flow/GetStorageDetails Design Flow.pptx
@@ -6,6 +6,8 @@
   </p:sldMasterIdLst>
   <p:sldIdLst>
     <p:sldId id="256" r:id="rId2"/>
+    <p:sldId id="257" r:id="rId3"/>
+    <p:sldId id="258" r:id="rId4"/>
   </p:sldIdLst>
   <p:sldSz cx="12192000" cy="6858000"/>
   <p:notesSz cx="6858000" cy="9144000"/>
@@ -104,6 +106,11 @@
       </a:defRPr>
     </a:lvl9pPr>
   </p:defaultTextStyle>
+  <p:extLst>
+    <p:ext uri="{EFAFB233-063F-42B5-8137-9DF3F51BA10A}">
+      <p15:sldGuideLst xmlns:p15="http://schemas.microsoft.com/office/powerpoint/2012/main"/>
+    </p:ext>
+  </p:extLst>
 </p:presentation>
 </file>
 
@@ -254,7 +261,7 @@
           <a:p>
             <a:fld id="{DA5AA0C9-F5FB-446F-B631-F9A7A053F640}" type="datetimeFigureOut">
               <a:rPr lang="en-US" smtClean="0"/>
-              <a:t>11/15/2021</a:t>
+              <a:t>11/16/2021</a:t>
             </a:fld>
             <a:endParaRPr lang="en-US"/>
           </a:p>
@@ -452,7 +459,7 @@
           <a:p>
             <a:fld id="{DA5AA0C9-F5FB-446F-B631-F9A7A053F640}" type="datetimeFigureOut">
               <a:rPr lang="en-US" smtClean="0"/>
-              <a:t>11/15/2021</a:t>
+              <a:t>11/16/2021</a:t>
             </a:fld>
             <a:endParaRPr lang="en-US"/>
           </a:p>
@@ -660,7 +667,7 @@
           <a:p>
             <a:fld id="{DA5AA0C9-F5FB-446F-B631-F9A7A053F640}" type="datetimeFigureOut">
               <a:rPr lang="en-US" smtClean="0"/>
-              <a:t>11/15/2021</a:t>
+              <a:t>11/16/2021</a:t>
             </a:fld>
             <a:endParaRPr lang="en-US"/>
           </a:p>
@@ -858,7 +865,7 @@
           <a:p>
             <a:fld id="{DA5AA0C9-F5FB-446F-B631-F9A7A053F640}" type="datetimeFigureOut">
               <a:rPr lang="en-US" smtClean="0"/>
-              <a:t>11/15/2021</a:t>
+              <a:t>11/16/2021</a:t>
             </a:fld>
             <a:endParaRPr lang="en-US"/>
           </a:p>
@@ -1133,7 +1140,7 @@
           <a:p>
             <a:fld id="{DA5AA0C9-F5FB-446F-B631-F9A7A053F640}" type="datetimeFigureOut">
               <a:rPr lang="en-US" smtClean="0"/>
-              <a:t>11/15/2021</a:t>
+              <a:t>11/16/2021</a:t>
             </a:fld>
             <a:endParaRPr lang="en-US"/>
           </a:p>
@@ -1398,7 +1405,7 @@
           <a:p>
             <a:fld id="{DA5AA0C9-F5FB-446F-B631-F9A7A053F640}" type="datetimeFigureOut">
               <a:rPr lang="en-US" smtClean="0"/>
-              <a:t>11/15/2021</a:t>
+              <a:t>11/16/2021</a:t>
             </a:fld>
             <a:endParaRPr lang="en-US"/>
           </a:p>
@@ -1810,7 +1817,7 @@
           <a:p>
             <a:fld id="{DA5AA0C9-F5FB-446F-B631-F9A7A053F640}" type="datetimeFigureOut">
               <a:rPr lang="en-US" smtClean="0"/>
-              <a:t>11/15/2021</a:t>
+              <a:t>11/16/2021</a:t>
             </a:fld>
             <a:endParaRPr lang="en-US"/>
           </a:p>
@@ -1951,7 +1958,7 @@
           <a:p>
             <a:fld id="{DA5AA0C9-F5FB-446F-B631-F9A7A053F640}" type="datetimeFigureOut">
               <a:rPr lang="en-US" smtClean="0"/>
-              <a:t>11/15/2021</a:t>
+              <a:t>11/16/2021</a:t>
             </a:fld>
             <a:endParaRPr lang="en-US"/>
           </a:p>
@@ -2064,7 +2071,7 @@
           <a:p>
             <a:fld id="{DA5AA0C9-F5FB-446F-B631-F9A7A053F640}" type="datetimeFigureOut">
               <a:rPr lang="en-US" smtClean="0"/>
-              <a:t>11/15/2021</a:t>
+              <a:t>11/16/2021</a:t>
             </a:fld>
             <a:endParaRPr lang="en-US"/>
           </a:p>
@@ -2375,7 +2382,7 @@
           <a:p>
             <a:fld id="{DA5AA0C9-F5FB-446F-B631-F9A7A053F640}" type="datetimeFigureOut">
               <a:rPr lang="en-US" smtClean="0"/>
-              <a:t>11/15/2021</a:t>
+              <a:t>11/16/2021</a:t>
             </a:fld>
             <a:endParaRPr lang="en-US"/>
           </a:p>
@@ -2663,7 +2670,7 @@
           <a:p>
             <a:fld id="{DA5AA0C9-F5FB-446F-B631-F9A7A053F640}" type="datetimeFigureOut">
               <a:rPr lang="en-US" smtClean="0"/>
-              <a:t>11/15/2021</a:t>
+              <a:t>11/16/2021</a:t>
             </a:fld>
             <a:endParaRPr lang="en-US"/>
           </a:p>
@@ -2904,7 +2911,7 @@
           <a:p>
             <a:fld id="{DA5AA0C9-F5FB-446F-B631-F9A7A053F640}" type="datetimeFigureOut">
               <a:rPr lang="en-US" smtClean="0"/>
-              <a:t>11/15/2021</a:t>
+              <a:t>11/16/2021</a:t>
             </a:fld>
             <a:endParaRPr lang="en-US"/>
           </a:p>
@@ -3339,7 +3346,7 @@
         </p:nvSpPr>
         <p:spPr>
           <a:xfrm>
-            <a:off x="1524000" y="1122363"/>
+            <a:off x="1524000" y="531521"/>
             <a:ext cx="9144000" cy="477837"/>
           </a:xfrm>
         </p:spPr>
@@ -3374,19 +3381,183 @@
         </p:nvSpPr>
         <p:spPr>
           <a:xfrm>
-            <a:off x="1524000" y="1913206"/>
-            <a:ext cx="9144000" cy="3344594"/>
+            <a:off x="1524000" y="1252024"/>
+            <a:ext cx="9144000" cy="5190979"/>
           </a:xfrm>
         </p:spPr>
         <p:txBody>
-          <a:bodyPr/>
-          <a:lstStyle/>
+          <a:bodyPr>
+            <a:noAutofit/>
+          </a:bodyPr>
+          <a:lstStyle/>
+          <a:p>
+            <a:pPr algn="l"/>
+            <a:r>
+              <a:rPr lang="en-US" sz="1400" b="1" u="sng" dirty="0"/>
+              <a:t>Product Use Case</a:t>
+            </a:r>
+          </a:p>
           <a:p>
             <a:pPr marL="342900" indent="-342900" algn="l">
               <a:buFont typeface="Arial" panose="020B0604020202020204" pitchFamily="34" charset="0"/>
               <a:buChar char="•"/>
             </a:pPr>
-            <a:endParaRPr lang="en-US" dirty="0"/>
+            <a:r>
+              <a:rPr lang="en-US" sz="1400" dirty="0"/>
+              <a:t>Pull Disk Space Info From A User Defined Path</a:t>
+            </a:r>
+          </a:p>
+          <a:p>
+            <a:pPr marL="342900" indent="-342900" algn="l">
+              <a:buFont typeface="Arial" panose="020B0604020202020204" pitchFamily="34" charset="0"/>
+              <a:buChar char="•"/>
+            </a:pPr>
+            <a:r>
+              <a:rPr lang="en-US" sz="1400" dirty="0"/>
+              <a:t>Format The Details Into JSON readable format</a:t>
+            </a:r>
+          </a:p>
+          <a:p>
+            <a:pPr algn="l"/>
+            <a:r>
+              <a:rPr lang="en-US" sz="1400" b="1" u="sng" dirty="0"/>
+              <a:t>MVP Offered : (Product)</a:t>
+            </a:r>
+          </a:p>
+          <a:p>
+            <a:pPr marL="342900" indent="-342900" algn="l">
+              <a:buFont typeface="Arial" panose="020B0604020202020204" pitchFamily="34" charset="0"/>
+              <a:buChar char="•"/>
+            </a:pPr>
+            <a:r>
+              <a:rPr lang="en-US" sz="1400" dirty="0"/>
+              <a:t>Enable </a:t>
+            </a:r>
+            <a:r>
+              <a:rPr lang="en-US" sz="1400" dirty="0" err="1"/>
+              <a:t>OsAgnostics</a:t>
+            </a:r>
+            <a:r>
+              <a:rPr lang="en-US" sz="1400" dirty="0"/>
+              <a:t>: To capture </a:t>
+            </a:r>
+            <a:r>
+              <a:rPr lang="en-US" sz="1400" dirty="0" err="1"/>
+              <a:t>diskSpaceDetails</a:t>
+            </a:r>
+            <a:r>
+              <a:rPr lang="en-US" sz="1400" dirty="0"/>
+              <a:t> independent of where product is installed/running</a:t>
+            </a:r>
+          </a:p>
+          <a:p>
+            <a:pPr marL="342900" indent="-342900" algn="l">
+              <a:buFont typeface="Arial" panose="020B0604020202020204" pitchFamily="34" charset="0"/>
+              <a:buChar char="•"/>
+            </a:pPr>
+            <a:r>
+              <a:rPr lang="en-US" sz="1400" dirty="0"/>
+              <a:t>Enable Multiple Format: Provide multiple formats like JSON, XML, Text, etc. to support multiple business operations model</a:t>
+            </a:r>
+          </a:p>
+          <a:p>
+            <a:pPr marL="342900" indent="-342900" algn="l">
+              <a:buFont typeface="Arial" panose="020B0604020202020204" pitchFamily="34" charset="0"/>
+              <a:buChar char="•"/>
+            </a:pPr>
+            <a:r>
+              <a:rPr lang="en-US" sz="1400" dirty="0"/>
+              <a:t>Enable Multiple Publish: Provide multiple publish methods like transfer desired formatted results to local disk, as email attachment, </a:t>
+            </a:r>
+            <a:r>
+              <a:rPr lang="en-US" sz="1400" dirty="0" err="1"/>
+              <a:t>ssh</a:t>
+            </a:r>
+            <a:r>
+              <a:rPr lang="en-US" sz="1400" dirty="0"/>
+              <a:t> to a shared path server, etc.</a:t>
+            </a:r>
+          </a:p>
+          <a:p>
+            <a:pPr algn="l"/>
+            <a:r>
+              <a:rPr lang="en-US" sz="1400" b="1" u="sng" dirty="0"/>
+              <a:t>MVP Offered : (DevOps)</a:t>
+            </a:r>
+          </a:p>
+          <a:p>
+            <a:pPr marL="342900" indent="-342900" algn="l">
+              <a:buFont typeface="Arial" panose="020B0604020202020204" pitchFamily="34" charset="0"/>
+              <a:buChar char="•"/>
+            </a:pPr>
+            <a:r>
+              <a:rPr lang="en-US" sz="1400" dirty="0"/>
+              <a:t>Enable CI-CD for multiple OS like Windows, Linux, etc.</a:t>
+            </a:r>
+          </a:p>
+          <a:p>
+            <a:pPr marL="342900" indent="-342900" algn="l">
+              <a:buFont typeface="Arial" panose="020B0604020202020204" pitchFamily="34" charset="0"/>
+              <a:buChar char="•"/>
+            </a:pPr>
+            <a:r>
+              <a:rPr lang="en-US" sz="1400" dirty="0"/>
+              <a:t>Enable SCM for version control and CI-CD set-up</a:t>
+            </a:r>
+          </a:p>
+          <a:p>
+            <a:pPr algn="l"/>
+            <a:r>
+              <a:rPr lang="en-US" sz="1400" b="1" u="sng" dirty="0"/>
+              <a:t>MVP Offered : (Infra-Structure)</a:t>
+            </a:r>
+          </a:p>
+          <a:p>
+            <a:pPr marL="342900" indent="-342900" algn="l">
+              <a:buFont typeface="Arial" panose="020B0604020202020204" pitchFamily="34" charset="0"/>
+              <a:buChar char="•"/>
+            </a:pPr>
+            <a:r>
+              <a:rPr lang="en-US" sz="1400" dirty="0"/>
+              <a:t>Enable Windows/Linux OS instances</a:t>
+            </a:r>
+          </a:p>
+          <a:p>
+            <a:pPr marL="342900" indent="-342900" algn="l">
+              <a:buFont typeface="Arial" panose="020B0604020202020204" pitchFamily="34" charset="0"/>
+              <a:buChar char="•"/>
+            </a:pPr>
+            <a:r>
+              <a:rPr lang="en-US" sz="1400" dirty="0"/>
+              <a:t>Enable Jenkins (CI-CD) in Windows/Linux OS</a:t>
+            </a:r>
+          </a:p>
+          <a:p>
+            <a:pPr marL="342900" indent="-342900" algn="l">
+              <a:buFont typeface="Arial" panose="020B0604020202020204" pitchFamily="34" charset="0"/>
+              <a:buChar char="•"/>
+            </a:pPr>
+            <a:r>
+              <a:rPr lang="en-US" sz="1400" dirty="0"/>
+              <a:t>Enable Git (SCM) in Windows/Linux OS</a:t>
+            </a:r>
+          </a:p>
+          <a:p>
+            <a:pPr marL="342900" indent="-342900" algn="l">
+              <a:buFont typeface="Arial" panose="020B0604020202020204" pitchFamily="34" charset="0"/>
+              <a:buChar char="•"/>
+            </a:pPr>
+            <a:r>
+              <a:rPr lang="en-US" sz="1400" dirty="0"/>
+              <a:t>Enable Python (Application Execution Language) in Windows/Linux OS</a:t>
+            </a:r>
+          </a:p>
+          <a:p>
+            <a:pPr marL="342900" indent="-342900" algn="l">
+              <a:buFont typeface="Arial" panose="020B0604020202020204" pitchFamily="34" charset="0"/>
+              <a:buChar char="•"/>
+            </a:pPr>
+            <a:endParaRPr lang="en-US" sz="1400" dirty="0"/>
           </a:p>
         </p:txBody>
       </p:sp>
@@ -3394,6 +3565,1810 @@
     <p:extLst>
       <p:ext uri="{BB962C8B-B14F-4D97-AF65-F5344CB8AC3E}">
         <p14:creationId xmlns:p14="http://schemas.microsoft.com/office/powerpoint/2010/main" val="1113527353"/>
+      </p:ext>
+    </p:extLst>
+  </p:cSld>
+  <p:clrMapOvr>
+    <a:masterClrMapping/>
+  </p:clrMapOvr>
+</p:sld>
+</file>
+
+<file path=ppt/slides/slide2.xml><?xml version="1.0" encoding="utf-8"?>
+<p:sld xmlns:a="http://schemas.openxmlformats.org/drawingml/2006/main" xmlns:r="http://schemas.openxmlformats.org/officeDocument/2006/relationships" xmlns:p="http://schemas.openxmlformats.org/presentationml/2006/main">
+  <p:cSld>
+    <p:spTree>
+      <p:nvGrpSpPr>
+        <p:cNvPr id="1" name=""/>
+        <p:cNvGrpSpPr/>
+        <p:nvPr/>
+      </p:nvGrpSpPr>
+      <p:grpSpPr>
+        <a:xfrm>
+          <a:off x="0" y="0"/>
+          <a:ext cx="0" cy="0"/>
+          <a:chOff x="0" y="0"/>
+          <a:chExt cx="0" cy="0"/>
+        </a:xfrm>
+      </p:grpSpPr>
+      <p:sp>
+        <p:nvSpPr>
+          <p:cNvPr id="2" name="Title 1">
+            <a:extLst>
+              <a:ext uri="{FF2B5EF4-FFF2-40B4-BE49-F238E27FC236}">
+                <a16:creationId xmlns:a16="http://schemas.microsoft.com/office/drawing/2014/main" id="{5B336246-F970-4E72-8DC3-5A0C7662B686}"/>
+              </a:ext>
+            </a:extLst>
+          </p:cNvPr>
+          <p:cNvSpPr>
+            <a:spLocks noGrp="1"/>
+          </p:cNvSpPr>
+          <p:nvPr>
+            <p:ph type="ctrTitle"/>
+          </p:nvPr>
+        </p:nvSpPr>
+        <p:spPr>
+          <a:xfrm>
+            <a:off x="1524000" y="644065"/>
+            <a:ext cx="9144000" cy="477837"/>
+          </a:xfrm>
+        </p:spPr>
+        <p:txBody>
+          <a:bodyPr>
+            <a:noAutofit/>
+          </a:bodyPr>
+          <a:lstStyle/>
+          <a:p>
+            <a:r>
+              <a:rPr lang="en-US" sz="3200" dirty="0"/>
+              <a:t>Product High Level Design Flow</a:t>
+            </a:r>
+          </a:p>
+        </p:txBody>
+      </p:sp>
+      <p:pic>
+        <p:nvPicPr>
+          <p:cNvPr id="8" name="Picture 7">
+            <a:extLst>
+              <a:ext uri="{FF2B5EF4-FFF2-40B4-BE49-F238E27FC236}">
+                <a16:creationId xmlns:a16="http://schemas.microsoft.com/office/drawing/2014/main" id="{43AFB9A5-0AA7-4BFE-9860-15FFFCD049EF}"/>
+              </a:ext>
+            </a:extLst>
+          </p:cNvPr>
+          <p:cNvPicPr>
+            <a:picLocks noChangeAspect="1"/>
+          </p:cNvPicPr>
+          <p:nvPr/>
+        </p:nvPicPr>
+        <p:blipFill>
+          <a:blip r:embed="rId2"/>
+          <a:stretch>
+            <a:fillRect/>
+          </a:stretch>
+        </p:blipFill>
+        <p:spPr>
+          <a:xfrm>
+            <a:off x="5527284" y="1135966"/>
+            <a:ext cx="6514660" cy="5011616"/>
+          </a:xfrm>
+          <a:prstGeom prst="rect">
+            <a:avLst/>
+          </a:prstGeom>
+        </p:spPr>
+      </p:pic>
+      <p:sp>
+        <p:nvSpPr>
+          <p:cNvPr id="9" name="Title 1">
+            <a:extLst>
+              <a:ext uri="{FF2B5EF4-FFF2-40B4-BE49-F238E27FC236}">
+                <a16:creationId xmlns:a16="http://schemas.microsoft.com/office/drawing/2014/main" id="{21A4F382-A6A7-4BE5-B917-F5B249C52EE3}"/>
+              </a:ext>
+            </a:extLst>
+          </p:cNvPr>
+          <p:cNvSpPr txBox="1">
+            <a:spLocks/>
+          </p:cNvSpPr>
+          <p:nvPr/>
+        </p:nvSpPr>
+        <p:spPr>
+          <a:xfrm>
+            <a:off x="1676400" y="1009358"/>
+            <a:ext cx="2809875" cy="5317589"/>
+          </a:xfrm>
+          <a:prstGeom prst="rect">
+            <a:avLst/>
+          </a:prstGeom>
+        </p:spPr>
+        <p:txBody>
+          <a:bodyPr vert="horz" lIns="91440" tIns="45720" rIns="91440" bIns="45720" rtlCol="0" anchor="b">
+            <a:noAutofit/>
+          </a:bodyPr>
+          <a:lstStyle>
+            <a:lvl1pPr algn="ctr" defTabSz="914400" rtl="0" eaLnBrk="1" latinLnBrk="0" hangingPunct="1">
+              <a:lnSpc>
+                <a:spcPct val="90000"/>
+              </a:lnSpc>
+              <a:spcBef>
+                <a:spcPct val="0"/>
+              </a:spcBef>
+              <a:buNone/>
+              <a:defRPr sz="6000" kern="1200">
+                <a:solidFill>
+                  <a:schemeClr val="tx1"/>
+                </a:solidFill>
+                <a:latin typeface="+mj-lt"/>
+                <a:ea typeface="+mj-ea"/>
+                <a:cs typeface="+mj-cs"/>
+              </a:defRPr>
+            </a:lvl1pPr>
+          </a:lstStyle>
+          <a:p>
+            <a:pPr algn="l"/>
+            <a:endParaRPr lang="en-US" sz="1200" dirty="0"/>
+          </a:p>
+        </p:txBody>
+      </p:sp>
+      <p:sp>
+        <p:nvSpPr>
+          <p:cNvPr id="13" name="Subtitle 2">
+            <a:extLst>
+              <a:ext uri="{FF2B5EF4-FFF2-40B4-BE49-F238E27FC236}">
+                <a16:creationId xmlns:a16="http://schemas.microsoft.com/office/drawing/2014/main" id="{A4A3C8F3-C5B8-46B2-99D3-68146B0FA66C}"/>
+              </a:ext>
+            </a:extLst>
+          </p:cNvPr>
+          <p:cNvSpPr>
+            <a:spLocks noGrp="1"/>
+          </p:cNvSpPr>
+          <p:nvPr>
+            <p:ph type="subTitle" idx="1"/>
+          </p:nvPr>
+        </p:nvSpPr>
+        <p:spPr>
+          <a:xfrm>
+            <a:off x="464234" y="1252024"/>
+            <a:ext cx="4797083" cy="5552760"/>
+          </a:xfrm>
+        </p:spPr>
+        <p:txBody>
+          <a:bodyPr>
+            <a:noAutofit/>
+          </a:bodyPr>
+          <a:lstStyle/>
+          <a:p>
+            <a:pPr algn="l">
+              <a:lnSpc>
+                <a:spcPct val="100000"/>
+              </a:lnSpc>
+              <a:spcBef>
+                <a:spcPts val="0"/>
+              </a:spcBef>
+            </a:pPr>
+            <a:r>
+              <a:rPr lang="en-US" sz="1400" b="1" u="sng" dirty="0"/>
+              <a:t>User:</a:t>
+            </a:r>
+          </a:p>
+          <a:p>
+            <a:pPr marL="285750" indent="-285750" algn="l">
+              <a:lnSpc>
+                <a:spcPct val="100000"/>
+              </a:lnSpc>
+              <a:spcBef>
+                <a:spcPts val="0"/>
+              </a:spcBef>
+              <a:buFont typeface="Wingdings" panose="05000000000000000000" pitchFamily="2" charset="2"/>
+              <a:buChar char="Ø"/>
+            </a:pPr>
+            <a:r>
+              <a:rPr lang="en-US" sz="1400" dirty="0"/>
+              <a:t>Develops Code</a:t>
+            </a:r>
+          </a:p>
+          <a:p>
+            <a:pPr marL="285750" indent="-285750" algn="l">
+              <a:lnSpc>
+                <a:spcPct val="100000"/>
+              </a:lnSpc>
+              <a:spcBef>
+                <a:spcPts val="0"/>
+              </a:spcBef>
+              <a:buFont typeface="Wingdings" panose="05000000000000000000" pitchFamily="2" charset="2"/>
+              <a:buChar char="Ø"/>
+            </a:pPr>
+            <a:endParaRPr lang="en-US" sz="1400" dirty="0"/>
+          </a:p>
+          <a:p>
+            <a:pPr algn="l">
+              <a:lnSpc>
+                <a:spcPct val="100000"/>
+              </a:lnSpc>
+              <a:spcBef>
+                <a:spcPts val="0"/>
+              </a:spcBef>
+            </a:pPr>
+            <a:r>
+              <a:rPr lang="en-US" sz="1400" b="1" u="sng" dirty="0"/>
+              <a:t>Code Editor:</a:t>
+            </a:r>
+          </a:p>
+          <a:p>
+            <a:pPr marL="285750" indent="-285750" algn="l">
+              <a:lnSpc>
+                <a:spcPct val="100000"/>
+              </a:lnSpc>
+              <a:spcBef>
+                <a:spcPts val="0"/>
+              </a:spcBef>
+              <a:buFont typeface="Wingdings" panose="05000000000000000000" pitchFamily="2" charset="2"/>
+              <a:buChar char="Ø"/>
+            </a:pPr>
+            <a:r>
+              <a:rPr lang="en-US" sz="1400" dirty="0"/>
+              <a:t>IntelliJ: Used as an IDE for code development.</a:t>
+            </a:r>
+          </a:p>
+          <a:p>
+            <a:pPr marL="285750" indent="-285750" algn="l">
+              <a:lnSpc>
+                <a:spcPct val="100000"/>
+              </a:lnSpc>
+              <a:spcBef>
+                <a:spcPts val="0"/>
+              </a:spcBef>
+              <a:buFont typeface="Wingdings" panose="05000000000000000000" pitchFamily="2" charset="2"/>
+              <a:buChar char="Ø"/>
+            </a:pPr>
+            <a:endParaRPr lang="en-US" sz="1400" dirty="0"/>
+          </a:p>
+          <a:p>
+            <a:pPr algn="l">
+              <a:lnSpc>
+                <a:spcPct val="100000"/>
+              </a:lnSpc>
+              <a:spcBef>
+                <a:spcPts val="0"/>
+              </a:spcBef>
+            </a:pPr>
+            <a:r>
+              <a:rPr lang="en-US" sz="1400" b="1" u="sng" dirty="0"/>
+              <a:t>SCM:</a:t>
+            </a:r>
+          </a:p>
+          <a:p>
+            <a:pPr marL="285750" indent="-285750" algn="l">
+              <a:lnSpc>
+                <a:spcPct val="100000"/>
+              </a:lnSpc>
+              <a:spcBef>
+                <a:spcPts val="0"/>
+              </a:spcBef>
+              <a:buFont typeface="Wingdings" panose="05000000000000000000" pitchFamily="2" charset="2"/>
+              <a:buChar char="Ø"/>
+            </a:pPr>
+            <a:r>
+              <a:rPr lang="en-US" sz="1400" dirty="0"/>
+              <a:t>GitHub: To manage code in GitHub</a:t>
+            </a:r>
+          </a:p>
+          <a:p>
+            <a:pPr marL="285750" indent="-285750" algn="l">
+              <a:lnSpc>
+                <a:spcPct val="100000"/>
+              </a:lnSpc>
+              <a:spcBef>
+                <a:spcPts val="0"/>
+              </a:spcBef>
+              <a:buFont typeface="Wingdings" panose="05000000000000000000" pitchFamily="2" charset="2"/>
+              <a:buChar char="Ø"/>
+            </a:pPr>
+            <a:r>
+              <a:rPr lang="en-US" sz="1400" dirty="0"/>
+              <a:t>Git Bash: For code check-in and commit in GitHub</a:t>
+            </a:r>
+          </a:p>
+          <a:p>
+            <a:pPr marL="285750" indent="-285750" algn="l">
+              <a:lnSpc>
+                <a:spcPct val="100000"/>
+              </a:lnSpc>
+              <a:spcBef>
+                <a:spcPts val="0"/>
+              </a:spcBef>
+              <a:buFont typeface="Wingdings" panose="05000000000000000000" pitchFamily="2" charset="2"/>
+              <a:buChar char="Ø"/>
+            </a:pPr>
+            <a:endParaRPr lang="en-US" sz="1400" dirty="0"/>
+          </a:p>
+          <a:p>
+            <a:pPr algn="l">
+              <a:lnSpc>
+                <a:spcPct val="100000"/>
+              </a:lnSpc>
+              <a:spcBef>
+                <a:spcPts val="0"/>
+              </a:spcBef>
+            </a:pPr>
+            <a:r>
+              <a:rPr lang="en-US" sz="1400" b="1" u="sng" dirty="0"/>
+              <a:t>CI-CD:</a:t>
+            </a:r>
+          </a:p>
+          <a:p>
+            <a:pPr algn="l">
+              <a:lnSpc>
+                <a:spcPct val="100000"/>
+              </a:lnSpc>
+              <a:spcBef>
+                <a:spcPts val="0"/>
+              </a:spcBef>
+            </a:pPr>
+            <a:r>
+              <a:rPr lang="en-US" sz="1400" dirty="0">
+                <a:solidFill>
+                  <a:srgbClr val="0070C0"/>
+                </a:solidFill>
+              </a:rPr>
+              <a:t>Windows OS:</a:t>
+            </a:r>
+          </a:p>
+          <a:p>
+            <a:pPr marL="285750" indent="-285750" algn="l">
+              <a:lnSpc>
+                <a:spcPct val="100000"/>
+              </a:lnSpc>
+              <a:spcBef>
+                <a:spcPts val="0"/>
+              </a:spcBef>
+              <a:buFont typeface="Wingdings" panose="05000000000000000000" pitchFamily="2" charset="2"/>
+              <a:buChar char="Ø"/>
+            </a:pPr>
+            <a:r>
+              <a:rPr lang="en-US" sz="1400" dirty="0"/>
+              <a:t>Git Bash: To check-in code</a:t>
+            </a:r>
+          </a:p>
+          <a:p>
+            <a:pPr marL="285750" indent="-285750" algn="l">
+              <a:lnSpc>
+                <a:spcPct val="100000"/>
+              </a:lnSpc>
+              <a:spcBef>
+                <a:spcPts val="0"/>
+              </a:spcBef>
+              <a:buFont typeface="Wingdings" panose="05000000000000000000" pitchFamily="2" charset="2"/>
+              <a:buChar char="Ø"/>
+            </a:pPr>
+            <a:r>
+              <a:rPr lang="en-US" sz="1400" dirty="0"/>
+              <a:t>Python Compiler: To compile and run python code</a:t>
+            </a:r>
+          </a:p>
+          <a:p>
+            <a:pPr marL="285750" indent="-285750" algn="l">
+              <a:lnSpc>
+                <a:spcPct val="100000"/>
+              </a:lnSpc>
+              <a:spcBef>
+                <a:spcPts val="0"/>
+              </a:spcBef>
+              <a:buFont typeface="Wingdings" panose="05000000000000000000" pitchFamily="2" charset="2"/>
+              <a:buChar char="Ø"/>
+            </a:pPr>
+            <a:r>
+              <a:rPr lang="en-US" sz="1400" dirty="0"/>
+              <a:t>Jenkins: To define code deployment as pipeline.</a:t>
+            </a:r>
+          </a:p>
+          <a:p>
+            <a:pPr algn="l">
+              <a:lnSpc>
+                <a:spcPct val="100000"/>
+              </a:lnSpc>
+              <a:spcBef>
+                <a:spcPts val="0"/>
+              </a:spcBef>
+            </a:pPr>
+            <a:r>
+              <a:rPr lang="en-US" sz="1400" dirty="0">
+                <a:solidFill>
+                  <a:srgbClr val="0070C0"/>
+                </a:solidFill>
+              </a:rPr>
+              <a:t>Windows OS -&gt; Linux Instance:</a:t>
+            </a:r>
+          </a:p>
+          <a:p>
+            <a:pPr marL="285750" indent="-285750" algn="l">
+              <a:lnSpc>
+                <a:spcPct val="100000"/>
+              </a:lnSpc>
+              <a:spcBef>
+                <a:spcPts val="0"/>
+              </a:spcBef>
+              <a:buFont typeface="Wingdings" panose="05000000000000000000" pitchFamily="2" charset="2"/>
+              <a:buChar char="Ø"/>
+            </a:pPr>
+            <a:r>
+              <a:rPr lang="en-US" sz="1400" dirty="0"/>
+              <a:t>Docker Desktop (Container Service): To manage Linux VM in windows OS.</a:t>
+            </a:r>
+          </a:p>
+          <a:p>
+            <a:pPr marL="285750" indent="-285750" algn="l">
+              <a:lnSpc>
+                <a:spcPct val="100000"/>
+              </a:lnSpc>
+              <a:spcBef>
+                <a:spcPts val="0"/>
+              </a:spcBef>
+              <a:buFont typeface="Wingdings" panose="05000000000000000000" pitchFamily="2" charset="2"/>
+              <a:buChar char="Ø"/>
+            </a:pPr>
+            <a:r>
+              <a:rPr lang="en-US" sz="1400" dirty="0"/>
+              <a:t>Git Bash: To check-in code</a:t>
+            </a:r>
+          </a:p>
+          <a:p>
+            <a:pPr marL="285750" indent="-285750" algn="l">
+              <a:lnSpc>
+                <a:spcPct val="100000"/>
+              </a:lnSpc>
+              <a:spcBef>
+                <a:spcPts val="0"/>
+              </a:spcBef>
+              <a:buFont typeface="Wingdings" panose="05000000000000000000" pitchFamily="2" charset="2"/>
+              <a:buChar char="Ø"/>
+            </a:pPr>
+            <a:r>
+              <a:rPr lang="en-US" sz="1400" dirty="0"/>
+              <a:t>Python Compiler: To compile and run python code</a:t>
+            </a:r>
+          </a:p>
+          <a:p>
+            <a:pPr marL="285750" indent="-285750" algn="l">
+              <a:lnSpc>
+                <a:spcPct val="100000"/>
+              </a:lnSpc>
+              <a:spcBef>
+                <a:spcPts val="0"/>
+              </a:spcBef>
+              <a:buFont typeface="Wingdings" panose="05000000000000000000" pitchFamily="2" charset="2"/>
+              <a:buChar char="Ø"/>
+            </a:pPr>
+            <a:r>
+              <a:rPr lang="en-US" sz="1400" dirty="0"/>
+              <a:t>Jenkins: To define code deployment as pipeline.</a:t>
+            </a:r>
+          </a:p>
+          <a:p>
+            <a:pPr algn="l">
+              <a:lnSpc>
+                <a:spcPct val="100000"/>
+              </a:lnSpc>
+              <a:spcBef>
+                <a:spcPts val="0"/>
+              </a:spcBef>
+            </a:pPr>
+            <a:r>
+              <a:rPr lang="en-US" sz="1400" dirty="0">
+                <a:solidFill>
+                  <a:srgbClr val="0070C0"/>
+                </a:solidFill>
+              </a:rPr>
+              <a:t>AWS EC2 Instance:</a:t>
+            </a:r>
+          </a:p>
+          <a:p>
+            <a:pPr marL="285750" indent="-285750" algn="l">
+              <a:lnSpc>
+                <a:spcPct val="100000"/>
+              </a:lnSpc>
+              <a:spcBef>
+                <a:spcPts val="0"/>
+              </a:spcBef>
+              <a:buFont typeface="Wingdings" panose="05000000000000000000" pitchFamily="2" charset="2"/>
+              <a:buChar char="Ø"/>
+            </a:pPr>
+            <a:r>
+              <a:rPr lang="en-US" sz="1400" dirty="0"/>
+              <a:t>Git Bash: To check-in code</a:t>
+            </a:r>
+          </a:p>
+          <a:p>
+            <a:pPr marL="285750" indent="-285750" algn="l">
+              <a:lnSpc>
+                <a:spcPct val="100000"/>
+              </a:lnSpc>
+              <a:spcBef>
+                <a:spcPts val="0"/>
+              </a:spcBef>
+              <a:buFont typeface="Wingdings" panose="05000000000000000000" pitchFamily="2" charset="2"/>
+              <a:buChar char="Ø"/>
+            </a:pPr>
+            <a:r>
+              <a:rPr lang="en-US" sz="1400" dirty="0"/>
+              <a:t>Python Compiler: To compile and run python code</a:t>
+            </a:r>
+          </a:p>
+          <a:p>
+            <a:pPr marL="285750" indent="-285750" algn="l">
+              <a:lnSpc>
+                <a:spcPct val="100000"/>
+              </a:lnSpc>
+              <a:spcBef>
+                <a:spcPts val="0"/>
+              </a:spcBef>
+              <a:buFont typeface="Wingdings" panose="05000000000000000000" pitchFamily="2" charset="2"/>
+              <a:buChar char="Ø"/>
+            </a:pPr>
+            <a:r>
+              <a:rPr lang="en-US" sz="1400" dirty="0"/>
+              <a:t>Jenkins: To define code deployment as pipeline.</a:t>
+            </a:r>
+          </a:p>
+        </p:txBody>
+      </p:sp>
+    </p:spTree>
+    <p:extLst>
+      <p:ext uri="{BB962C8B-B14F-4D97-AF65-F5344CB8AC3E}">
+        <p14:creationId xmlns:p14="http://schemas.microsoft.com/office/powerpoint/2010/main" val="3568542050"/>
+      </p:ext>
+    </p:extLst>
+  </p:cSld>
+  <p:clrMapOvr>
+    <a:masterClrMapping/>
+  </p:clrMapOvr>
+</p:sld>
+</file>
+
+<file path=ppt/slides/slide3.xml><?xml version="1.0" encoding="utf-8"?>
+<p:sld xmlns:a="http://schemas.openxmlformats.org/drawingml/2006/main" xmlns:r="http://schemas.openxmlformats.org/officeDocument/2006/relationships" xmlns:p="http://schemas.openxmlformats.org/presentationml/2006/main">
+  <p:cSld>
+    <p:spTree>
+      <p:nvGrpSpPr>
+        <p:cNvPr id="1" name=""/>
+        <p:cNvGrpSpPr/>
+        <p:nvPr/>
+      </p:nvGrpSpPr>
+      <p:grpSpPr>
+        <a:xfrm>
+          <a:off x="0" y="0"/>
+          <a:ext cx="0" cy="0"/>
+          <a:chOff x="0" y="0"/>
+          <a:chExt cx="0" cy="0"/>
+        </a:xfrm>
+      </p:grpSpPr>
+      <p:sp>
+        <p:nvSpPr>
+          <p:cNvPr id="2" name="Title 1">
+            <a:extLst>
+              <a:ext uri="{FF2B5EF4-FFF2-40B4-BE49-F238E27FC236}">
+                <a16:creationId xmlns:a16="http://schemas.microsoft.com/office/drawing/2014/main" id="{5B336246-F970-4E72-8DC3-5A0C7662B686}"/>
+              </a:ext>
+            </a:extLst>
+          </p:cNvPr>
+          <p:cNvSpPr>
+            <a:spLocks noGrp="1"/>
+          </p:cNvSpPr>
+          <p:nvPr>
+            <p:ph type="ctrTitle"/>
+          </p:nvPr>
+        </p:nvSpPr>
+        <p:spPr>
+          <a:xfrm>
+            <a:off x="1524000" y="644065"/>
+            <a:ext cx="9144000" cy="477837"/>
+          </a:xfrm>
+        </p:spPr>
+        <p:txBody>
+          <a:bodyPr>
+            <a:noAutofit/>
+          </a:bodyPr>
+          <a:lstStyle/>
+          <a:p>
+            <a:r>
+              <a:rPr lang="en-US" sz="3200" dirty="0"/>
+              <a:t>Modules/Components Design Flow</a:t>
+            </a:r>
+          </a:p>
+        </p:txBody>
+      </p:sp>
+      <p:sp>
+        <p:nvSpPr>
+          <p:cNvPr id="5" name="Rectangle 4">
+            <a:extLst>
+              <a:ext uri="{FF2B5EF4-FFF2-40B4-BE49-F238E27FC236}">
+                <a16:creationId xmlns:a16="http://schemas.microsoft.com/office/drawing/2014/main" id="{60A99C81-F6EC-46C1-B6F0-A3DF21AE214F}"/>
+              </a:ext>
+            </a:extLst>
+          </p:cNvPr>
+          <p:cNvSpPr/>
+          <p:nvPr/>
+        </p:nvSpPr>
+        <p:spPr>
+          <a:xfrm>
+            <a:off x="4512649" y="1375108"/>
+            <a:ext cx="4462905" cy="4360990"/>
+          </a:xfrm>
+          <a:prstGeom prst="rect">
+            <a:avLst/>
+          </a:prstGeom>
+        </p:spPr>
+        <p:style>
+          <a:lnRef idx="2">
+            <a:schemeClr val="accent6"/>
+          </a:lnRef>
+          <a:fillRef idx="1">
+            <a:schemeClr val="lt1"/>
+          </a:fillRef>
+          <a:effectRef idx="0">
+            <a:schemeClr val="accent6"/>
+          </a:effectRef>
+          <a:fontRef idx="minor">
+            <a:schemeClr val="dk1"/>
+          </a:fontRef>
+        </p:style>
+        <p:txBody>
+          <a:bodyPr rtlCol="0" anchor="ctr"/>
+          <a:lstStyle/>
+          <a:p>
+            <a:r>
+              <a:rPr lang="en-US" sz="900" dirty="0"/>
+              <a:t>Class GetStorage:`</a:t>
+            </a:r>
+          </a:p>
+          <a:p>
+            <a:r>
+              <a:rPr lang="en-US" sz="900" dirty="0"/>
+              <a:t>     def __init__(self, *param)</a:t>
+            </a:r>
+          </a:p>
+          <a:p>
+            <a:r>
+              <a:rPr lang="en-US" sz="900" dirty="0"/>
+              <a:t>     def validateParameters(self, *param)</a:t>
+            </a:r>
+          </a:p>
+          <a:p>
+            <a:r>
+              <a:rPr lang="en-US" sz="900" dirty="0"/>
+              <a:t>     def getStorageDetails(self, *param)</a:t>
+            </a:r>
+          </a:p>
+          <a:p>
+            <a:r>
+              <a:rPr lang="en-US" sz="900" dirty="0"/>
+              <a:t>     def runScript(self, *param)</a:t>
+            </a:r>
+          </a:p>
+          <a:p>
+            <a:r>
+              <a:rPr lang="en-US" sz="900" dirty="0"/>
+              <a:t>     def loadStorage(self, *param)</a:t>
+            </a:r>
+          </a:p>
+          <a:p>
+            <a:r>
+              <a:rPr lang="en-US" sz="900" dirty="0"/>
+              <a:t>     def extractDetailsWindows(self, *param)</a:t>
+            </a:r>
+          </a:p>
+          <a:p>
+            <a:r>
+              <a:rPr lang="en-US" sz="900" dirty="0"/>
+              <a:t>     def extractDetailsLinux(self, *param)</a:t>
+            </a:r>
+          </a:p>
+          <a:p>
+            <a:r>
+              <a:rPr lang="en-US" sz="900" dirty="0"/>
+              <a:t>     def fileFormatter(self, *param)</a:t>
+            </a:r>
+          </a:p>
+          <a:p>
+            <a:r>
+              <a:rPr lang="en-US" sz="900" dirty="0"/>
+              <a:t>     def loadJsonFormat(self, *param)</a:t>
+            </a:r>
+          </a:p>
+          <a:p>
+            <a:r>
+              <a:rPr lang="en-US" sz="900" dirty="0"/>
+              <a:t>     def loadXMLFormat(self, *param)</a:t>
+            </a:r>
+          </a:p>
+          <a:p>
+            <a:r>
+              <a:rPr lang="en-US" sz="900" dirty="0"/>
+              <a:t>     def loadTextFormat(self, *param)</a:t>
+            </a:r>
+          </a:p>
+          <a:p>
+            <a:r>
+              <a:rPr lang="en-US" sz="900" dirty="0"/>
+              <a:t>     def publishResults(self, *param)</a:t>
+            </a:r>
+          </a:p>
+          <a:p>
+            <a:r>
+              <a:rPr lang="en-US" sz="900" dirty="0"/>
+              <a:t>     def transferFileToDisk(self, *param)</a:t>
+            </a:r>
+          </a:p>
+          <a:p>
+            <a:r>
+              <a:rPr lang="en-US" sz="900" dirty="0"/>
+              <a:t>     def transferFileToEmail(self, *param)</a:t>
+            </a:r>
+          </a:p>
+          <a:p>
+            <a:r>
+              <a:rPr lang="en-US" sz="900" dirty="0"/>
+              <a:t>     def transferFileToSharedServer(self, *param)</a:t>
+            </a:r>
+          </a:p>
+          <a:p>
+            <a:endParaRPr lang="en-US" sz="900" dirty="0"/>
+          </a:p>
+          <a:p>
+            <a:r>
+              <a:rPr lang="en-US" sz="900" dirty="0"/>
+              <a:t>parameterFile = "param.json"</a:t>
+            </a:r>
+          </a:p>
+          <a:p>
+            <a:r>
+              <a:rPr lang="en-US" sz="900" dirty="0"/>
+              <a:t>parameterFile = ParameterFile(parameterFile)</a:t>
+            </a:r>
+          </a:p>
+          <a:p>
+            <a:r>
+              <a:rPr lang="en-US" sz="900" dirty="0"/>
+              <a:t>osProxy, scriptName, fileFormat, publishType, path = parameterFile.readParameterFile()</a:t>
+            </a:r>
+          </a:p>
+          <a:p>
+            <a:r>
+              <a:rPr lang="en-US" sz="900" dirty="0"/>
+              <a:t>newPath = r'C:\{}'.format(path)</a:t>
+            </a:r>
+          </a:p>
+          <a:p>
+            <a:r>
+              <a:rPr lang="en-US" sz="900" dirty="0"/>
+              <a:t>validator = Validator()</a:t>
+            </a:r>
+          </a:p>
+          <a:p>
+            <a:r>
+              <a:rPr lang="en-US" sz="900" dirty="0"/>
+              <a:t>getStorage = GetStorage(newPath, osProxy, scriptName, fileFormat, publishType, validator)</a:t>
+            </a:r>
+          </a:p>
+          <a:p>
+            <a:r>
+              <a:rPr lang="en-US" sz="900" dirty="0"/>
+              <a:t>getStorage.validateParameters()</a:t>
+            </a:r>
+          </a:p>
+          <a:p>
+            <a:r>
+              <a:rPr lang="en-US" sz="900" dirty="0"/>
+              <a:t>getStorage.getStorageDetails()</a:t>
+            </a:r>
+          </a:p>
+          <a:p>
+            <a:r>
+              <a:rPr lang="en-US" sz="900" dirty="0"/>
+              <a:t>getStorage.runScript()</a:t>
+            </a:r>
+          </a:p>
+          <a:p>
+            <a:r>
+              <a:rPr lang="en-US" sz="900" dirty="0"/>
+              <a:t>getStorage.loadStorage()</a:t>
+            </a:r>
+          </a:p>
+          <a:p>
+            <a:r>
+              <a:rPr lang="en-US" sz="900" dirty="0"/>
+              <a:t>getStorage.fileFormatter()</a:t>
+            </a:r>
+          </a:p>
+          <a:p>
+            <a:r>
+              <a:rPr lang="en-US" sz="900" dirty="0"/>
+              <a:t>getStorage.publishResults()</a:t>
+            </a:r>
+          </a:p>
+        </p:txBody>
+      </p:sp>
+      <p:sp>
+        <p:nvSpPr>
+          <p:cNvPr id="10" name="Rectangle 9">
+            <a:extLst>
+              <a:ext uri="{FF2B5EF4-FFF2-40B4-BE49-F238E27FC236}">
+                <a16:creationId xmlns:a16="http://schemas.microsoft.com/office/drawing/2014/main" id="{C326569B-B108-43FB-BB51-05839DDEB7C6}"/>
+              </a:ext>
+            </a:extLst>
+          </p:cNvPr>
+          <p:cNvSpPr/>
+          <p:nvPr/>
+        </p:nvSpPr>
+        <p:spPr>
+          <a:xfrm>
+            <a:off x="362811" y="1362075"/>
+            <a:ext cx="3961377" cy="5187290"/>
+          </a:xfrm>
+          <a:prstGeom prst="rect">
+            <a:avLst/>
+          </a:prstGeom>
+          <a:solidFill>
+            <a:schemeClr val="accent1">
+              <a:lumMod val="20000"/>
+              <a:lumOff val="80000"/>
+            </a:schemeClr>
+          </a:solidFill>
+        </p:spPr>
+        <p:style>
+          <a:lnRef idx="2">
+            <a:schemeClr val="accent6"/>
+          </a:lnRef>
+          <a:fillRef idx="1">
+            <a:schemeClr val="lt1"/>
+          </a:fillRef>
+          <a:effectRef idx="0">
+            <a:schemeClr val="accent6"/>
+          </a:effectRef>
+          <a:fontRef idx="minor">
+            <a:schemeClr val="dk1"/>
+          </a:fontRef>
+        </p:style>
+        <p:txBody>
+          <a:bodyPr rtlCol="0" anchor="ctr"/>
+          <a:lstStyle/>
+          <a:p>
+            <a:r>
+              <a:rPr lang="en-US" sz="800" dirty="0"/>
+              <a:t>String condaInstallPath ="C:\\Users\\manoj\\Anaconda3\\condabin";</a:t>
+            </a:r>
+          </a:p>
+          <a:p>
+            <a:r>
+              <a:rPr lang="en-US" sz="800" dirty="0"/>
+              <a:t>String pythonInstallPath = "C:\\Users\\manoj\\AppData\\Local\\Programs\\Python\\Python37-32";</a:t>
+            </a:r>
+          </a:p>
+          <a:p>
+            <a:r>
+              <a:rPr lang="en-US" sz="800" dirty="0"/>
+              <a:t>String parameterFileName = "parameter.json";</a:t>
+            </a:r>
+          </a:p>
+          <a:p>
+            <a:r>
+              <a:rPr lang="en-US" sz="800" dirty="0"/>
+              <a:t>pipeline {</a:t>
+            </a:r>
+          </a:p>
+          <a:p>
+            <a:r>
+              <a:rPr lang="en-US" sz="800" dirty="0"/>
+              <a:t>        stage('pipeline initialization') {</a:t>
+            </a:r>
+          </a:p>
+          <a:p>
+            <a:r>
+              <a:rPr lang="en-US" sz="800" dirty="0"/>
+              <a:t>            steps { }</a:t>
+            </a:r>
+          </a:p>
+          <a:p>
+            <a:r>
+              <a:rPr lang="en-US" sz="800" dirty="0"/>
+              <a:t>        }</a:t>
+            </a:r>
+          </a:p>
+          <a:p>
+            <a:r>
+              <a:rPr lang="en-US" sz="800" dirty="0"/>
+              <a:t>        stage('code checkout') {</a:t>
+            </a:r>
+          </a:p>
+          <a:p>
+            <a:r>
+              <a:rPr lang="en-US" sz="800" dirty="0"/>
+              <a:t>            steps{}</a:t>
+            </a:r>
+          </a:p>
+          <a:p>
+            <a:r>
+              <a:rPr lang="en-US" sz="800" dirty="0"/>
+              <a:t>        }</a:t>
+            </a:r>
+          </a:p>
+          <a:p>
+            <a:r>
+              <a:rPr lang="en-US" sz="800" dirty="0"/>
+              <a:t>        stage('prepare environment execute the module') {</a:t>
+            </a:r>
+          </a:p>
+          <a:p>
+            <a:r>
+              <a:rPr lang="en-US" sz="800" dirty="0"/>
+              <a:t>            steps {</a:t>
+            </a:r>
+          </a:p>
+          <a:p>
+            <a:r>
+              <a:rPr lang="en-US" sz="800" dirty="0"/>
+              <a:t>                script {</a:t>
+            </a:r>
+          </a:p>
+          <a:p>
+            <a:r>
+              <a:rPr lang="en-US" sz="800" dirty="0"/>
+              <a:t>                    def workspace = env.WORKSPACE</a:t>
+            </a:r>
+          </a:p>
+          <a:p>
+            <a:r>
+              <a:rPr lang="en-US" sz="800" dirty="0"/>
+              <a:t>                    dir(condaInstallPath) {</a:t>
+            </a:r>
+          </a:p>
+          <a:p>
+            <a:r>
+              <a:rPr lang="en-US" sz="800" dirty="0"/>
+              <a:t>                        bat '''dir</a:t>
+            </a:r>
+          </a:p>
+          <a:p>
+            <a:r>
+              <a:rPr lang="en-US" sz="800" dirty="0"/>
+              <a:t>                            conda env list</a:t>
+            </a:r>
+          </a:p>
+          <a:p>
+            <a:r>
+              <a:rPr lang="en-US" sz="800" dirty="0"/>
+              <a:t>                            conda activate base'''</a:t>
+            </a:r>
+          </a:p>
+          <a:p>
+            <a:r>
+              <a:rPr lang="en-US" sz="800" dirty="0"/>
+              <a:t>                    }</a:t>
+            </a:r>
+          </a:p>
+          <a:p>
+            <a:r>
+              <a:rPr lang="en-US" sz="800" dirty="0"/>
+              <a:t>                    dir(workspace) {</a:t>
+            </a:r>
+          </a:p>
+          <a:p>
+            <a:r>
+              <a:rPr lang="en-US" sz="800" dirty="0"/>
+              <a:t>                        bat '‘’SET PATH=%PATH%;%PYTHON_PATH%</a:t>
+            </a:r>
+          </a:p>
+          <a:p>
+            <a:r>
+              <a:rPr lang="en-US" sz="800" dirty="0"/>
+              <a:t>                            type parameter.json &gt; param.json</a:t>
+            </a:r>
+          </a:p>
+          <a:p>
+            <a:r>
+              <a:rPr lang="en-US" sz="800" dirty="0"/>
+              <a:t>                            python GetStorage.py'‘’</a:t>
+            </a:r>
+          </a:p>
+          <a:p>
+            <a:r>
+              <a:rPr lang="en-US" sz="800" dirty="0"/>
+              <a:t>                    }</a:t>
+            </a:r>
+          </a:p>
+          <a:p>
+            <a:r>
+              <a:rPr lang="en-US" sz="800" dirty="0"/>
+              <a:t>                 }</a:t>
+            </a:r>
+          </a:p>
+          <a:p>
+            <a:r>
+              <a:rPr lang="en-US" sz="800" dirty="0"/>
+              <a:t>            }</a:t>
+            </a:r>
+          </a:p>
+          <a:p>
+            <a:r>
+              <a:rPr lang="en-US" sz="800" dirty="0"/>
+              <a:t>        }</a:t>
+            </a:r>
+          </a:p>
+          <a:p>
+            <a:r>
+              <a:rPr lang="en-US" sz="800" dirty="0"/>
+              <a:t>        stage('Move the result file to a different space location') {</a:t>
+            </a:r>
+          </a:p>
+          <a:p>
+            <a:r>
+              <a:rPr lang="en-US" sz="800" dirty="0"/>
+              <a:t>            steps {</a:t>
+            </a:r>
+          </a:p>
+          <a:p>
+            <a:r>
+              <a:rPr lang="en-US" sz="800" dirty="0"/>
+              <a:t>                dir(workspace) {</a:t>
+            </a:r>
+          </a:p>
+          <a:p>
+            <a:r>
+              <a:rPr lang="en-US" sz="800" dirty="0"/>
+              <a:t>                bat '''copy "PublishResults\\diskSpaceInfo.json" /A "C:\\Users\\manoj\\Downloads\\Python Study\\Coding Challenges\\Interview Problem Statement\\System_Programming_getStorageDetails\\CaptureResults\\Windows\\diskSpaceInfo.json" /A /Y'''</a:t>
+            </a:r>
+          </a:p>
+          <a:p>
+            <a:r>
+              <a:rPr lang="en-US" sz="800" dirty="0"/>
+              <a:t>                }</a:t>
+            </a:r>
+          </a:p>
+          <a:p>
+            <a:r>
+              <a:rPr lang="en-US" sz="800" dirty="0"/>
+              <a:t>            }</a:t>
+            </a:r>
+          </a:p>
+          <a:p>
+            <a:r>
+              <a:rPr lang="en-US" sz="800" dirty="0"/>
+              <a:t>        }</a:t>
+            </a:r>
+          </a:p>
+          <a:p>
+            <a:r>
+              <a:rPr lang="en-US" sz="800" dirty="0"/>
+              <a:t>    }</a:t>
+            </a:r>
+          </a:p>
+          <a:p>
+            <a:r>
+              <a:rPr lang="en-US" sz="800" dirty="0"/>
+              <a:t>}</a:t>
+            </a:r>
+          </a:p>
+        </p:txBody>
+      </p:sp>
+      <p:cxnSp>
+        <p:nvCxnSpPr>
+          <p:cNvPr id="20" name="Connector: Elbow 19">
+            <a:extLst>
+              <a:ext uri="{FF2B5EF4-FFF2-40B4-BE49-F238E27FC236}">
+                <a16:creationId xmlns:a16="http://schemas.microsoft.com/office/drawing/2014/main" id="{ADDDF8E3-80EE-4539-A311-109E972D99EF}"/>
+              </a:ext>
+            </a:extLst>
+          </p:cNvPr>
+          <p:cNvCxnSpPr>
+            <a:cxnSpLocks/>
+          </p:cNvCxnSpPr>
+          <p:nvPr/>
+        </p:nvCxnSpPr>
+        <p:spPr>
+          <a:xfrm flipV="1">
+            <a:off x="2117558" y="3937753"/>
+            <a:ext cx="2395091" cy="477837"/>
+          </a:xfrm>
+          <a:prstGeom prst="bentConnector3">
+            <a:avLst/>
+          </a:prstGeom>
+          <a:ln>
+            <a:tailEnd type="triangle"/>
+          </a:ln>
+        </p:spPr>
+        <p:style>
+          <a:lnRef idx="1">
+            <a:schemeClr val="accent1"/>
+          </a:lnRef>
+          <a:fillRef idx="0">
+            <a:schemeClr val="accent1"/>
+          </a:fillRef>
+          <a:effectRef idx="0">
+            <a:schemeClr val="accent1"/>
+          </a:effectRef>
+          <a:fontRef idx="minor">
+            <a:schemeClr val="tx1"/>
+          </a:fontRef>
+        </p:style>
+      </p:cxnSp>
+      <p:sp>
+        <p:nvSpPr>
+          <p:cNvPr id="21" name="Rectangle 20">
+            <a:extLst>
+              <a:ext uri="{FF2B5EF4-FFF2-40B4-BE49-F238E27FC236}">
+                <a16:creationId xmlns:a16="http://schemas.microsoft.com/office/drawing/2014/main" id="{A9BC44F7-5FED-43D8-857B-76D59189D897}"/>
+              </a:ext>
+            </a:extLst>
+          </p:cNvPr>
+          <p:cNvSpPr/>
+          <p:nvPr/>
+        </p:nvSpPr>
+        <p:spPr>
+          <a:xfrm>
+            <a:off x="1229054" y="1117832"/>
+            <a:ext cx="2056405" cy="244244"/>
+          </a:xfrm>
+          <a:prstGeom prst="rect">
+            <a:avLst/>
+          </a:prstGeom>
+        </p:spPr>
+        <p:style>
+          <a:lnRef idx="2">
+            <a:schemeClr val="accent1">
+              <a:shade val="50000"/>
+            </a:schemeClr>
+          </a:lnRef>
+          <a:fillRef idx="1">
+            <a:schemeClr val="accent1"/>
+          </a:fillRef>
+          <a:effectRef idx="0">
+            <a:schemeClr val="accent1"/>
+          </a:effectRef>
+          <a:fontRef idx="minor">
+            <a:schemeClr val="lt1"/>
+          </a:fontRef>
+        </p:style>
+        <p:txBody>
+          <a:bodyPr rtlCol="0" anchor="ctr"/>
+          <a:lstStyle/>
+          <a:p>
+            <a:pPr algn="ctr"/>
+            <a:r>
+              <a:rPr lang="en-US" dirty="0"/>
+              <a:t>Jenkins File</a:t>
+            </a:r>
+          </a:p>
+        </p:txBody>
+      </p:sp>
+      <p:sp>
+        <p:nvSpPr>
+          <p:cNvPr id="25" name="Rectangle 24">
+            <a:extLst>
+              <a:ext uri="{FF2B5EF4-FFF2-40B4-BE49-F238E27FC236}">
+                <a16:creationId xmlns:a16="http://schemas.microsoft.com/office/drawing/2014/main" id="{93F003D8-5BEA-4FE0-BBF5-0927730C37A6}"/>
+              </a:ext>
+            </a:extLst>
+          </p:cNvPr>
+          <p:cNvSpPr/>
+          <p:nvPr/>
+        </p:nvSpPr>
+        <p:spPr>
+          <a:xfrm>
+            <a:off x="9252283" y="1363075"/>
+            <a:ext cx="2310063" cy="586041"/>
+          </a:xfrm>
+          <a:prstGeom prst="rect">
+            <a:avLst/>
+          </a:prstGeom>
+        </p:spPr>
+        <p:style>
+          <a:lnRef idx="2">
+            <a:schemeClr val="accent4"/>
+          </a:lnRef>
+          <a:fillRef idx="1">
+            <a:schemeClr val="lt1"/>
+          </a:fillRef>
+          <a:effectRef idx="0">
+            <a:schemeClr val="accent4"/>
+          </a:effectRef>
+          <a:fontRef idx="minor">
+            <a:schemeClr val="dk1"/>
+          </a:fontRef>
+        </p:style>
+        <p:txBody>
+          <a:bodyPr rtlCol="0" anchor="ctr"/>
+          <a:lstStyle/>
+          <a:p>
+            <a:r>
+              <a:rPr lang="en-US" sz="900" dirty="0"/>
+              <a:t>Class ParameterFile:`</a:t>
+            </a:r>
+          </a:p>
+          <a:p>
+            <a:r>
+              <a:rPr lang="en-US" sz="900" dirty="0"/>
+              <a:t>     def __init__(self, *param)</a:t>
+            </a:r>
+          </a:p>
+          <a:p>
+            <a:r>
+              <a:rPr lang="en-US" sz="900" dirty="0"/>
+              <a:t>     def </a:t>
+            </a:r>
+            <a:r>
+              <a:rPr lang="en-US" sz="900" dirty="0" err="1"/>
+              <a:t>readParamterFile</a:t>
+            </a:r>
+            <a:r>
+              <a:rPr lang="en-US" sz="900" dirty="0"/>
+              <a:t>(self, *param)</a:t>
+            </a:r>
+          </a:p>
+        </p:txBody>
+      </p:sp>
+      <p:sp>
+        <p:nvSpPr>
+          <p:cNvPr id="27" name="Rectangle 26">
+            <a:extLst>
+              <a:ext uri="{FF2B5EF4-FFF2-40B4-BE49-F238E27FC236}">
+                <a16:creationId xmlns:a16="http://schemas.microsoft.com/office/drawing/2014/main" id="{F2267F14-0C4E-4091-A8C2-7413CE73D72E}"/>
+              </a:ext>
+            </a:extLst>
+          </p:cNvPr>
+          <p:cNvSpPr/>
+          <p:nvPr/>
+        </p:nvSpPr>
+        <p:spPr>
+          <a:xfrm>
+            <a:off x="5460160" y="1121902"/>
+            <a:ext cx="2056405" cy="244244"/>
+          </a:xfrm>
+          <a:prstGeom prst="rect">
+            <a:avLst/>
+          </a:prstGeom>
+        </p:spPr>
+        <p:style>
+          <a:lnRef idx="2">
+            <a:schemeClr val="accent1">
+              <a:shade val="50000"/>
+            </a:schemeClr>
+          </a:lnRef>
+          <a:fillRef idx="1">
+            <a:schemeClr val="accent1"/>
+          </a:fillRef>
+          <a:effectRef idx="0">
+            <a:schemeClr val="accent1"/>
+          </a:effectRef>
+          <a:fontRef idx="minor">
+            <a:schemeClr val="lt1"/>
+          </a:fontRef>
+        </p:style>
+        <p:txBody>
+          <a:bodyPr rtlCol="0" anchor="ctr"/>
+          <a:lstStyle/>
+          <a:p>
+            <a:pPr algn="ctr"/>
+            <a:r>
+              <a:rPr lang="en-US" dirty="0"/>
+              <a:t>GetStorage.py</a:t>
+            </a:r>
+          </a:p>
+        </p:txBody>
+      </p:sp>
+      <p:sp>
+        <p:nvSpPr>
+          <p:cNvPr id="28" name="Rectangle 27">
+            <a:extLst>
+              <a:ext uri="{FF2B5EF4-FFF2-40B4-BE49-F238E27FC236}">
+                <a16:creationId xmlns:a16="http://schemas.microsoft.com/office/drawing/2014/main" id="{7C8E2988-E17D-495E-9EEA-CB613416A7BE}"/>
+              </a:ext>
+            </a:extLst>
+          </p:cNvPr>
+          <p:cNvSpPr/>
+          <p:nvPr/>
+        </p:nvSpPr>
+        <p:spPr>
+          <a:xfrm>
+            <a:off x="9379111" y="1106799"/>
+            <a:ext cx="2056405" cy="244244"/>
+          </a:xfrm>
+          <a:prstGeom prst="rect">
+            <a:avLst/>
+          </a:prstGeom>
+        </p:spPr>
+        <p:style>
+          <a:lnRef idx="2">
+            <a:schemeClr val="accent1">
+              <a:shade val="50000"/>
+            </a:schemeClr>
+          </a:lnRef>
+          <a:fillRef idx="1">
+            <a:schemeClr val="accent1"/>
+          </a:fillRef>
+          <a:effectRef idx="0">
+            <a:schemeClr val="accent1"/>
+          </a:effectRef>
+          <a:fontRef idx="minor">
+            <a:schemeClr val="lt1"/>
+          </a:fontRef>
+        </p:style>
+        <p:txBody>
+          <a:bodyPr rtlCol="0" anchor="ctr"/>
+          <a:lstStyle/>
+          <a:p>
+            <a:pPr algn="ctr"/>
+            <a:r>
+              <a:rPr lang="en-US" dirty="0"/>
+              <a:t>ParameterFile.py</a:t>
+            </a:r>
+          </a:p>
+        </p:txBody>
+      </p:sp>
+      <p:cxnSp>
+        <p:nvCxnSpPr>
+          <p:cNvPr id="31" name="Connector: Elbow 30">
+            <a:extLst>
+              <a:ext uri="{FF2B5EF4-FFF2-40B4-BE49-F238E27FC236}">
+                <a16:creationId xmlns:a16="http://schemas.microsoft.com/office/drawing/2014/main" id="{C447FD03-0D16-423B-93AC-0BC04A23BFB4}"/>
+              </a:ext>
+            </a:extLst>
+          </p:cNvPr>
+          <p:cNvCxnSpPr>
+            <a:cxnSpLocks/>
+          </p:cNvCxnSpPr>
+          <p:nvPr/>
+        </p:nvCxnSpPr>
+        <p:spPr>
+          <a:xfrm flipV="1">
+            <a:off x="6771109" y="1595936"/>
+            <a:ext cx="2541334" cy="2496068"/>
+          </a:xfrm>
+          <a:prstGeom prst="bentConnector3">
+            <a:avLst/>
+          </a:prstGeom>
+          <a:ln>
+            <a:tailEnd type="triangle"/>
+          </a:ln>
+        </p:spPr>
+        <p:style>
+          <a:lnRef idx="1">
+            <a:schemeClr val="accent2"/>
+          </a:lnRef>
+          <a:fillRef idx="0">
+            <a:schemeClr val="accent2"/>
+          </a:fillRef>
+          <a:effectRef idx="0">
+            <a:schemeClr val="accent2"/>
+          </a:effectRef>
+          <a:fontRef idx="minor">
+            <a:schemeClr val="tx1"/>
+          </a:fontRef>
+        </p:style>
+      </p:cxnSp>
+      <p:sp>
+        <p:nvSpPr>
+          <p:cNvPr id="35" name="TextBox 34">
+            <a:extLst>
+              <a:ext uri="{FF2B5EF4-FFF2-40B4-BE49-F238E27FC236}">
+                <a16:creationId xmlns:a16="http://schemas.microsoft.com/office/drawing/2014/main" id="{21B169E7-9800-433F-B1CC-FC3109E75ECB}"/>
+              </a:ext>
+            </a:extLst>
+          </p:cNvPr>
+          <p:cNvSpPr txBox="1"/>
+          <p:nvPr/>
+        </p:nvSpPr>
+        <p:spPr>
+          <a:xfrm>
+            <a:off x="2454442" y="3290325"/>
+            <a:ext cx="1515979" cy="215444"/>
+          </a:xfrm>
+          <a:prstGeom prst="rect">
+            <a:avLst/>
+          </a:prstGeom>
+          <a:solidFill>
+            <a:schemeClr val="accent2">
+              <a:lumMod val="60000"/>
+              <a:lumOff val="40000"/>
+            </a:schemeClr>
+          </a:solidFill>
+        </p:spPr>
+        <p:txBody>
+          <a:bodyPr wrap="square" rtlCol="0">
+            <a:spAutoFit/>
+          </a:bodyPr>
+          <a:lstStyle/>
+          <a:p>
+            <a:r>
+              <a:rPr lang="en-US" sz="800" dirty="0"/>
+              <a:t>Prepare Execution Environment</a:t>
+            </a:r>
+          </a:p>
+        </p:txBody>
+      </p:sp>
+      <p:sp>
+        <p:nvSpPr>
+          <p:cNvPr id="37" name="TextBox 36">
+            <a:extLst>
+              <a:ext uri="{FF2B5EF4-FFF2-40B4-BE49-F238E27FC236}">
+                <a16:creationId xmlns:a16="http://schemas.microsoft.com/office/drawing/2014/main" id="{4D0E4232-0E16-46F6-956B-55847B5F2EED}"/>
+              </a:ext>
+            </a:extLst>
+          </p:cNvPr>
+          <p:cNvSpPr txBox="1"/>
+          <p:nvPr/>
+        </p:nvSpPr>
+        <p:spPr>
+          <a:xfrm>
+            <a:off x="3521238" y="1499283"/>
+            <a:ext cx="698636" cy="338554"/>
+          </a:xfrm>
+          <a:prstGeom prst="rect">
+            <a:avLst/>
+          </a:prstGeom>
+          <a:solidFill>
+            <a:schemeClr val="accent2">
+              <a:lumMod val="60000"/>
+              <a:lumOff val="40000"/>
+            </a:schemeClr>
+          </a:solidFill>
+        </p:spPr>
+        <p:txBody>
+          <a:bodyPr wrap="square" rtlCol="0">
+            <a:spAutoFit/>
+          </a:bodyPr>
+          <a:lstStyle/>
+          <a:p>
+            <a:r>
+              <a:rPr lang="en-US" sz="800" dirty="0"/>
+              <a:t>Jenkins Parameters</a:t>
+            </a:r>
+          </a:p>
+        </p:txBody>
+      </p:sp>
+      <p:sp>
+        <p:nvSpPr>
+          <p:cNvPr id="38" name="TextBox 37">
+            <a:extLst>
+              <a:ext uri="{FF2B5EF4-FFF2-40B4-BE49-F238E27FC236}">
+                <a16:creationId xmlns:a16="http://schemas.microsoft.com/office/drawing/2014/main" id="{BB68FD74-5178-456E-ABFB-AD697C6874B4}"/>
+              </a:ext>
+            </a:extLst>
+          </p:cNvPr>
+          <p:cNvSpPr txBox="1"/>
+          <p:nvPr/>
+        </p:nvSpPr>
+        <p:spPr>
+          <a:xfrm>
+            <a:off x="1018676" y="4489468"/>
+            <a:ext cx="1183104" cy="215444"/>
+          </a:xfrm>
+          <a:prstGeom prst="rect">
+            <a:avLst/>
+          </a:prstGeom>
+          <a:solidFill>
+            <a:schemeClr val="accent2">
+              <a:lumMod val="60000"/>
+              <a:lumOff val="40000"/>
+            </a:schemeClr>
+          </a:solidFill>
+        </p:spPr>
+        <p:txBody>
+          <a:bodyPr wrap="square" rtlCol="0">
+            <a:spAutoFit/>
+          </a:bodyPr>
+          <a:lstStyle/>
+          <a:p>
+            <a:r>
+              <a:rPr lang="en-US" sz="800" dirty="0"/>
+              <a:t>Trigger Python Module</a:t>
+            </a:r>
+          </a:p>
+        </p:txBody>
+      </p:sp>
+      <p:sp>
+        <p:nvSpPr>
+          <p:cNvPr id="39" name="TextBox 38">
+            <a:extLst>
+              <a:ext uri="{FF2B5EF4-FFF2-40B4-BE49-F238E27FC236}">
+                <a16:creationId xmlns:a16="http://schemas.microsoft.com/office/drawing/2014/main" id="{C370CAEE-1742-47F6-925F-E423451EA956}"/>
+              </a:ext>
+            </a:extLst>
+          </p:cNvPr>
+          <p:cNvSpPr txBox="1"/>
+          <p:nvPr/>
+        </p:nvSpPr>
+        <p:spPr>
+          <a:xfrm>
+            <a:off x="978564" y="5796899"/>
+            <a:ext cx="2101519" cy="215444"/>
+          </a:xfrm>
+          <a:prstGeom prst="rect">
+            <a:avLst/>
+          </a:prstGeom>
+          <a:solidFill>
+            <a:schemeClr val="accent2">
+              <a:lumMod val="60000"/>
+              <a:lumOff val="40000"/>
+            </a:schemeClr>
+          </a:solidFill>
+        </p:spPr>
+        <p:txBody>
+          <a:bodyPr wrap="square" rtlCol="0">
+            <a:spAutoFit/>
+          </a:bodyPr>
+          <a:lstStyle/>
+          <a:p>
+            <a:r>
+              <a:rPr lang="en-US" sz="800" dirty="0"/>
+              <a:t>Pull Results From Workspace To Local Storage</a:t>
+            </a:r>
+          </a:p>
+        </p:txBody>
+      </p:sp>
+      <p:cxnSp>
+        <p:nvCxnSpPr>
+          <p:cNvPr id="49" name="Connector: Elbow 48">
+            <a:extLst>
+              <a:ext uri="{FF2B5EF4-FFF2-40B4-BE49-F238E27FC236}">
+                <a16:creationId xmlns:a16="http://schemas.microsoft.com/office/drawing/2014/main" id="{12AD08E6-CE13-4CC6-8C0F-8F7509369D77}"/>
+              </a:ext>
+            </a:extLst>
+          </p:cNvPr>
+          <p:cNvCxnSpPr>
+            <a:cxnSpLocks/>
+          </p:cNvCxnSpPr>
+          <p:nvPr/>
+        </p:nvCxnSpPr>
+        <p:spPr>
+          <a:xfrm rot="5400000" flipH="1" flipV="1">
+            <a:off x="7781448" y="2537391"/>
+            <a:ext cx="2364159" cy="914403"/>
+          </a:xfrm>
+          <a:prstGeom prst="bentConnector3">
+            <a:avLst>
+              <a:gd name="adj1" fmla="val 100383"/>
+            </a:avLst>
+          </a:prstGeom>
+          <a:ln>
+            <a:tailEnd type="triangle"/>
+          </a:ln>
+        </p:spPr>
+        <p:style>
+          <a:lnRef idx="1">
+            <a:schemeClr val="accent2"/>
+          </a:lnRef>
+          <a:fillRef idx="0">
+            <a:schemeClr val="accent2"/>
+          </a:fillRef>
+          <a:effectRef idx="0">
+            <a:schemeClr val="accent2"/>
+          </a:effectRef>
+          <a:fontRef idx="minor">
+            <a:schemeClr val="tx1"/>
+          </a:fontRef>
+        </p:style>
+      </p:cxnSp>
+      <p:sp>
+        <p:nvSpPr>
+          <p:cNvPr id="52" name="Rectangle 51">
+            <a:extLst>
+              <a:ext uri="{FF2B5EF4-FFF2-40B4-BE49-F238E27FC236}">
+                <a16:creationId xmlns:a16="http://schemas.microsoft.com/office/drawing/2014/main" id="{A607C658-CFD6-43F7-B12A-257B026382C1}"/>
+              </a:ext>
+            </a:extLst>
+          </p:cNvPr>
+          <p:cNvSpPr/>
+          <p:nvPr/>
+        </p:nvSpPr>
+        <p:spPr>
+          <a:xfrm>
+            <a:off x="9260305" y="2477999"/>
+            <a:ext cx="2310063" cy="586041"/>
+          </a:xfrm>
+          <a:prstGeom prst="rect">
+            <a:avLst/>
+          </a:prstGeom>
+        </p:spPr>
+        <p:style>
+          <a:lnRef idx="2">
+            <a:schemeClr val="accent6"/>
+          </a:lnRef>
+          <a:fillRef idx="1">
+            <a:schemeClr val="lt1"/>
+          </a:fillRef>
+          <a:effectRef idx="0">
+            <a:schemeClr val="accent6"/>
+          </a:effectRef>
+          <a:fontRef idx="minor">
+            <a:schemeClr val="dk1"/>
+          </a:fontRef>
+        </p:style>
+        <p:txBody>
+          <a:bodyPr rtlCol="0" anchor="ctr"/>
+          <a:lstStyle/>
+          <a:p>
+            <a:r>
+              <a:rPr lang="en-US" sz="900" dirty="0"/>
+              <a:t>Class Validator:`</a:t>
+            </a:r>
+          </a:p>
+          <a:p>
+            <a:r>
+              <a:rPr lang="en-US" sz="900" dirty="0"/>
+              <a:t>     def </a:t>
+            </a:r>
+            <a:r>
+              <a:rPr lang="en-US" sz="900" dirty="0" err="1"/>
+              <a:t>validatorNull</a:t>
+            </a:r>
+            <a:r>
+              <a:rPr lang="en-US" sz="900" dirty="0"/>
+              <a:t>(self, *param)</a:t>
+            </a:r>
+          </a:p>
+          <a:p>
+            <a:r>
+              <a:rPr lang="en-US" sz="900" dirty="0"/>
+              <a:t>     def </a:t>
+            </a:r>
+            <a:r>
+              <a:rPr lang="en-US" sz="900" dirty="0" err="1"/>
+              <a:t>validateEmpty</a:t>
+            </a:r>
+            <a:r>
+              <a:rPr lang="en-US" sz="900" dirty="0"/>
+              <a:t>(self, *param)</a:t>
+            </a:r>
+          </a:p>
+          <a:p>
+            <a:r>
+              <a:rPr lang="en-US" sz="900" dirty="0"/>
+              <a:t>     def </a:t>
+            </a:r>
+            <a:r>
+              <a:rPr lang="en-US" sz="900" dirty="0" err="1"/>
+              <a:t>validateGetValue</a:t>
+            </a:r>
+            <a:r>
+              <a:rPr lang="en-US" sz="900" dirty="0"/>
+              <a:t>(self, *param)</a:t>
+            </a:r>
+          </a:p>
+        </p:txBody>
+      </p:sp>
+      <p:sp>
+        <p:nvSpPr>
+          <p:cNvPr id="53" name="Rectangle 52">
+            <a:extLst>
+              <a:ext uri="{FF2B5EF4-FFF2-40B4-BE49-F238E27FC236}">
+                <a16:creationId xmlns:a16="http://schemas.microsoft.com/office/drawing/2014/main" id="{8A36B22A-7B21-48D5-8711-024853F46C0E}"/>
+              </a:ext>
+            </a:extLst>
+          </p:cNvPr>
+          <p:cNvSpPr/>
+          <p:nvPr/>
+        </p:nvSpPr>
+        <p:spPr>
+          <a:xfrm>
+            <a:off x="9387133" y="2221723"/>
+            <a:ext cx="2056405" cy="244244"/>
+          </a:xfrm>
+          <a:prstGeom prst="rect">
+            <a:avLst/>
+          </a:prstGeom>
+        </p:spPr>
+        <p:style>
+          <a:lnRef idx="2">
+            <a:schemeClr val="accent1">
+              <a:shade val="50000"/>
+            </a:schemeClr>
+          </a:lnRef>
+          <a:fillRef idx="1">
+            <a:schemeClr val="accent1"/>
+          </a:fillRef>
+          <a:effectRef idx="0">
+            <a:schemeClr val="accent1"/>
+          </a:effectRef>
+          <a:fontRef idx="minor">
+            <a:schemeClr val="lt1"/>
+          </a:fontRef>
+        </p:style>
+        <p:txBody>
+          <a:bodyPr rtlCol="0" anchor="ctr"/>
+          <a:lstStyle/>
+          <a:p>
+            <a:pPr algn="ctr"/>
+            <a:r>
+              <a:rPr lang="en-US" dirty="0"/>
+              <a:t>Validator.py</a:t>
+            </a:r>
+          </a:p>
+        </p:txBody>
+      </p:sp>
+      <p:cxnSp>
+        <p:nvCxnSpPr>
+          <p:cNvPr id="55" name="Connector: Elbow 54">
+            <a:extLst>
+              <a:ext uri="{FF2B5EF4-FFF2-40B4-BE49-F238E27FC236}">
+                <a16:creationId xmlns:a16="http://schemas.microsoft.com/office/drawing/2014/main" id="{E77437D9-D7DE-45D2-B3B6-8B9821C9F8D4}"/>
+              </a:ext>
+            </a:extLst>
+          </p:cNvPr>
+          <p:cNvCxnSpPr>
+            <a:cxnSpLocks/>
+          </p:cNvCxnSpPr>
+          <p:nvPr/>
+        </p:nvCxnSpPr>
+        <p:spPr>
+          <a:xfrm flipV="1">
+            <a:off x="5678906" y="2622884"/>
+            <a:ext cx="3581399" cy="1890648"/>
+          </a:xfrm>
+          <a:prstGeom prst="bentConnector3">
+            <a:avLst>
+              <a:gd name="adj1" fmla="val 85274"/>
+            </a:avLst>
+          </a:prstGeom>
+          <a:ln>
+            <a:tailEnd type="triangle"/>
+          </a:ln>
+        </p:spPr>
+        <p:style>
+          <a:lnRef idx="1">
+            <a:schemeClr val="accent6"/>
+          </a:lnRef>
+          <a:fillRef idx="0">
+            <a:schemeClr val="accent6"/>
+          </a:fillRef>
+          <a:effectRef idx="0">
+            <a:schemeClr val="accent6"/>
+          </a:effectRef>
+          <a:fontRef idx="minor">
+            <a:schemeClr val="tx1"/>
+          </a:fontRef>
+        </p:style>
+      </p:cxnSp>
+      <p:cxnSp>
+        <p:nvCxnSpPr>
+          <p:cNvPr id="67" name="Connector: Elbow 66">
+            <a:extLst>
+              <a:ext uri="{FF2B5EF4-FFF2-40B4-BE49-F238E27FC236}">
+                <a16:creationId xmlns:a16="http://schemas.microsoft.com/office/drawing/2014/main" id="{AEDA1797-201D-4EB2-917D-25206E70DD9F}"/>
+              </a:ext>
+            </a:extLst>
+          </p:cNvPr>
+          <p:cNvCxnSpPr/>
+          <p:nvPr/>
+        </p:nvCxnSpPr>
+        <p:spPr>
+          <a:xfrm>
+            <a:off x="6488362" y="1949116"/>
+            <a:ext cx="2763921" cy="894854"/>
+          </a:xfrm>
+          <a:prstGeom prst="bentConnector3">
+            <a:avLst/>
+          </a:prstGeom>
+          <a:ln>
+            <a:tailEnd type="triangle"/>
+          </a:ln>
+        </p:spPr>
+        <p:style>
+          <a:lnRef idx="1">
+            <a:schemeClr val="accent6"/>
+          </a:lnRef>
+          <a:fillRef idx="0">
+            <a:schemeClr val="accent6"/>
+          </a:fillRef>
+          <a:effectRef idx="0">
+            <a:schemeClr val="accent6"/>
+          </a:effectRef>
+          <a:fontRef idx="minor">
+            <a:schemeClr val="tx1"/>
+          </a:fontRef>
+        </p:style>
+      </p:cxnSp>
+    </p:spTree>
+    <p:extLst>
+      <p:ext uri="{BB962C8B-B14F-4D97-AF65-F5344CB8AC3E}">
+        <p14:creationId xmlns:p14="http://schemas.microsoft.com/office/powerpoint/2010/main" val="2728604786"/>
       </p:ext>
     </p:extLst>
   </p:cSld>

</xml_diff>